<commit_message>
Fix command classes, alignment issues in goals
</commit_message>
<xml_diff>
--- a/docs/diagrams/GeneralParsingSequenceDiagram.pptx
+++ b/docs/diagrams/GeneralParsingSequenceDiagram.pptx
@@ -261,7 +261,7 @@
           <a:p>
             <a:fld id="{220FF535-4542-5D40-B139-C63806418E3E}" type="datetimeFigureOut">
               <a:rPr lang="en-US" smtClean="0"/>
-              <a:t>10/31/19</a:t>
+              <a:t>11/6/19</a:t>
             </a:fld>
             <a:endParaRPr lang="en-US"/>
           </a:p>
@@ -461,7 +461,7 @@
           <a:p>
             <a:fld id="{220FF535-4542-5D40-B139-C63806418E3E}" type="datetimeFigureOut">
               <a:rPr lang="en-US" smtClean="0"/>
-              <a:t>10/31/19</a:t>
+              <a:t>11/6/19</a:t>
             </a:fld>
             <a:endParaRPr lang="en-US"/>
           </a:p>
@@ -671,7 +671,7 @@
           <a:p>
             <a:fld id="{220FF535-4542-5D40-B139-C63806418E3E}" type="datetimeFigureOut">
               <a:rPr lang="en-US" smtClean="0"/>
-              <a:t>10/31/19</a:t>
+              <a:t>11/6/19</a:t>
             </a:fld>
             <a:endParaRPr lang="en-US"/>
           </a:p>
@@ -871,7 +871,7 @@
           <a:p>
             <a:fld id="{220FF535-4542-5D40-B139-C63806418E3E}" type="datetimeFigureOut">
               <a:rPr lang="en-US" smtClean="0"/>
-              <a:t>10/31/19</a:t>
+              <a:t>11/6/19</a:t>
             </a:fld>
             <a:endParaRPr lang="en-US"/>
           </a:p>
@@ -1147,7 +1147,7 @@
           <a:p>
             <a:fld id="{220FF535-4542-5D40-B139-C63806418E3E}" type="datetimeFigureOut">
               <a:rPr lang="en-US" smtClean="0"/>
-              <a:t>10/31/19</a:t>
+              <a:t>11/6/19</a:t>
             </a:fld>
             <a:endParaRPr lang="en-US"/>
           </a:p>
@@ -1415,7 +1415,7 @@
           <a:p>
             <a:fld id="{220FF535-4542-5D40-B139-C63806418E3E}" type="datetimeFigureOut">
               <a:rPr lang="en-US" smtClean="0"/>
-              <a:t>10/31/19</a:t>
+              <a:t>11/6/19</a:t>
             </a:fld>
             <a:endParaRPr lang="en-US"/>
           </a:p>
@@ -1830,7 +1830,7 @@
           <a:p>
             <a:fld id="{220FF535-4542-5D40-B139-C63806418E3E}" type="datetimeFigureOut">
               <a:rPr lang="en-US" smtClean="0"/>
-              <a:t>10/31/19</a:t>
+              <a:t>11/6/19</a:t>
             </a:fld>
             <a:endParaRPr lang="en-US"/>
           </a:p>
@@ -1972,7 +1972,7 @@
           <a:p>
             <a:fld id="{220FF535-4542-5D40-B139-C63806418E3E}" type="datetimeFigureOut">
               <a:rPr lang="en-US" smtClean="0"/>
-              <a:t>10/31/19</a:t>
+              <a:t>11/6/19</a:t>
             </a:fld>
             <a:endParaRPr lang="en-US"/>
           </a:p>
@@ -2085,7 +2085,7 @@
           <a:p>
             <a:fld id="{220FF535-4542-5D40-B139-C63806418E3E}" type="datetimeFigureOut">
               <a:rPr lang="en-US" smtClean="0"/>
-              <a:t>10/31/19</a:t>
+              <a:t>11/6/19</a:t>
             </a:fld>
             <a:endParaRPr lang="en-US"/>
           </a:p>
@@ -2398,7 +2398,7 @@
           <a:p>
             <a:fld id="{220FF535-4542-5D40-B139-C63806418E3E}" type="datetimeFigureOut">
               <a:rPr lang="en-US" smtClean="0"/>
-              <a:t>10/31/19</a:t>
+              <a:t>11/6/19</a:t>
             </a:fld>
             <a:endParaRPr lang="en-US"/>
           </a:p>
@@ -2687,7 +2687,7 @@
           <a:p>
             <a:fld id="{220FF535-4542-5D40-B139-C63806418E3E}" type="datetimeFigureOut">
               <a:rPr lang="en-US" smtClean="0"/>
-              <a:t>10/31/19</a:t>
+              <a:t>11/6/19</a:t>
             </a:fld>
             <a:endParaRPr lang="en-US"/>
           </a:p>
@@ -2930,7 +2930,7 @@
           <a:p>
             <a:fld id="{220FF535-4542-5D40-B139-C63806418E3E}" type="datetimeFigureOut">
               <a:rPr lang="en-US" smtClean="0"/>
-              <a:t>10/31/19</a:t>
+              <a:t>11/6/19</a:t>
             </a:fld>
             <a:endParaRPr lang="en-US"/>
           </a:p>
@@ -5293,50 +5293,6 @@
           </p:cxnSp>
           <p:sp>
             <p:nvSpPr>
-              <p:cNvPr id="237" name="Rectangle 236">
-                <a:extLst>
-                  <a:ext uri="{FF2B5EF4-FFF2-40B4-BE49-F238E27FC236}">
-                    <a16:creationId xmlns:a16="http://schemas.microsoft.com/office/drawing/2014/main" id="{9B77138B-2275-9B4A-BCDB-E9EF672CBF48}"/>
-                  </a:ext>
-                </a:extLst>
-              </p:cNvPr>
-              <p:cNvSpPr/>
-              <p:nvPr/>
-            </p:nvSpPr>
-            <p:spPr>
-              <a:xfrm>
-                <a:off x="1829074" y="5502694"/>
-                <a:ext cx="6719024" cy="760599"/>
-              </a:xfrm>
-              <a:prstGeom prst="rect">
-                <a:avLst/>
-              </a:prstGeom>
-            </p:spPr>
-            <p:style>
-              <a:lnRef idx="2">
-                <a:schemeClr val="accent6"/>
-              </a:lnRef>
-              <a:fillRef idx="1">
-                <a:schemeClr val="lt1"/>
-              </a:fillRef>
-              <a:effectRef idx="0">
-                <a:schemeClr val="accent6"/>
-              </a:effectRef>
-              <a:fontRef idx="minor">
-                <a:schemeClr val="dk1"/>
-              </a:fontRef>
-            </p:style>
-            <p:txBody>
-              <a:bodyPr rtlCol="0" anchor="ctr"/>
-              <a:lstStyle/>
-              <a:p>
-                <a:pPr algn="ctr"/>
-                <a:endParaRPr lang="en-US"/>
-              </a:p>
-            </p:txBody>
-          </p:sp>
-          <p:sp>
-            <p:nvSpPr>
               <p:cNvPr id="238" name="Snip and Round Single Corner of Rectangle 237">
                 <a:extLst>
                   <a:ext uri="{FF2B5EF4-FFF2-40B4-BE49-F238E27FC236}">
@@ -6307,6 +6263,51 @@
               </a:effectRef>
               <a:fontRef idx="minor">
                 <a:schemeClr val="lt1"/>
+              </a:fontRef>
+            </p:style>
+            <p:txBody>
+              <a:bodyPr rtlCol="0" anchor="ctr"/>
+              <a:lstStyle/>
+              <a:p>
+                <a:pPr algn="ctr"/>
+                <a:endParaRPr lang="en-US"/>
+              </a:p>
+            </p:txBody>
+          </p:sp>
+          <p:sp>
+            <p:nvSpPr>
+              <p:cNvPr id="237" name="Rectangle 236">
+                <a:extLst>
+                  <a:ext uri="{FF2B5EF4-FFF2-40B4-BE49-F238E27FC236}">
+                    <a16:creationId xmlns:a16="http://schemas.microsoft.com/office/drawing/2014/main" id="{9B77138B-2275-9B4A-BCDB-E9EF672CBF48}"/>
+                  </a:ext>
+                </a:extLst>
+              </p:cNvPr>
+              <p:cNvSpPr/>
+              <p:nvPr/>
+            </p:nvSpPr>
+            <p:spPr>
+              <a:xfrm>
+                <a:off x="1829074" y="5502694"/>
+                <a:ext cx="6719024" cy="760599"/>
+              </a:xfrm>
+              <a:prstGeom prst="rect">
+                <a:avLst/>
+              </a:prstGeom>
+              <a:noFill/>
+            </p:spPr>
+            <p:style>
+              <a:lnRef idx="2">
+                <a:schemeClr val="accent6"/>
+              </a:lnRef>
+              <a:fillRef idx="1">
+                <a:schemeClr val="lt1"/>
+              </a:fillRef>
+              <a:effectRef idx="0">
+                <a:schemeClr val="accent6"/>
+              </a:effectRef>
+              <a:fontRef idx="minor">
+                <a:schemeClr val="dk1"/>
               </a:fontRef>
             </p:style>
             <p:txBody>

</xml_diff>